<commit_message>
included e2e-tests and node_modules
</commit_message>
<xml_diff>
--- a/AngularJS.pptx
+++ b/AngularJS.pptx
@@ -5,7 +5,7 @@
     <p:sldMasterId id="2147484404" r:id="rId1"/>
   </p:sldMasterIdLst>
   <p:notesMasterIdLst>
-    <p:notesMasterId r:id="rId20"/>
+    <p:notesMasterId r:id="rId21"/>
   </p:notesMasterIdLst>
   <p:sldIdLst>
     <p:sldId id="256" r:id="rId2"/>
@@ -17,15 +17,16 @@
     <p:sldId id="261" r:id="rId8"/>
     <p:sldId id="262" r:id="rId9"/>
     <p:sldId id="264" r:id="rId10"/>
-    <p:sldId id="265" r:id="rId11"/>
-    <p:sldId id="267" r:id="rId12"/>
-    <p:sldId id="268" r:id="rId13"/>
-    <p:sldId id="270" r:id="rId14"/>
-    <p:sldId id="271" r:id="rId15"/>
-    <p:sldId id="272" r:id="rId16"/>
+    <p:sldId id="272" r:id="rId11"/>
+    <p:sldId id="265" r:id="rId12"/>
+    <p:sldId id="267" r:id="rId13"/>
+    <p:sldId id="268" r:id="rId14"/>
+    <p:sldId id="270" r:id="rId15"/>
+    <p:sldId id="271" r:id="rId16"/>
     <p:sldId id="273" r:id="rId17"/>
     <p:sldId id="269" r:id="rId18"/>
     <p:sldId id="274" r:id="rId19"/>
+    <p:sldId id="275" r:id="rId20"/>
   </p:sldIdLst>
   <p:sldSz cx="9144000" cy="6858000" type="screen4x3"/>
   <p:notesSz cx="6858000" cy="9144000"/>
@@ -4395,79 +4396,55 @@
           <a:p>
             <a:r>
               <a:rPr lang="en-US" dirty="0" smtClean="0"/>
-              <a:t>Controllers </a:t>
+              <a:t>Angular Components</a:t>
             </a:r>
             <a:endParaRPr lang="en-US" dirty="0"/>
           </a:p>
         </p:txBody>
       </p:sp>
-      <p:sp>
-        <p:nvSpPr>
-          <p:cNvPr id="3" name="Content Placeholder 2"/>
-          <p:cNvSpPr>
-            <a:spLocks noGrp="1"/>
-          </p:cNvSpPr>
-          <p:nvPr>
-            <p:ph idx="1"/>
-          </p:nvPr>
-        </p:nvSpPr>
-        <p:spPr/>
-        <p:txBody>
-          <a:bodyPr/>
-          <a:lstStyle/>
-          <a:p>
-            <a:r>
-              <a:rPr lang="en-US" b="1" dirty="0" smtClean="0"/>
-              <a:t>ng-controller</a:t>
-            </a:r>
-          </a:p>
-          <a:p>
-            <a:endParaRPr lang="en-US" b="1" dirty="0" smtClean="0"/>
-          </a:p>
-          <a:p>
-            <a:r>
-              <a:rPr lang="en-US" dirty="0" smtClean="0"/>
-              <a:t>Constructor function</a:t>
-            </a:r>
-          </a:p>
-          <a:p>
-            <a:r>
-              <a:rPr lang="en-US" dirty="0" smtClean="0"/>
-              <a:t>Creates a new child scope: $scope (you can think of it as the view-model)</a:t>
-            </a:r>
-          </a:p>
-          <a:p>
-            <a:r>
-              <a:rPr lang="en-US" dirty="0" smtClean="0"/>
-              <a:t>When to use controller:</a:t>
-            </a:r>
-          </a:p>
-          <a:p>
-            <a:pPr lvl="1"/>
-            <a:r>
-              <a:rPr lang="en-US" dirty="0" smtClean="0"/>
-              <a:t>Use controllers to set initial state of $scope</a:t>
-            </a:r>
-          </a:p>
-          <a:p>
-            <a:pPr lvl="1"/>
-            <a:r>
-              <a:rPr lang="en-US" dirty="0" smtClean="0"/>
-              <a:t>Add behaviors to $scope </a:t>
-            </a:r>
-          </a:p>
-          <a:p>
-            <a:r>
-              <a:rPr lang="en-US" dirty="0" smtClean="0"/>
-              <a:t>This is where your imperative logic belongs to!</a:t>
-            </a:r>
-          </a:p>
-        </p:txBody>
-      </p:sp>
+      <p:pic>
+        <p:nvPicPr>
+          <p:cNvPr id="5122" name="Picture 2" descr="http://www.adevedo.com/Articles_images/AngularJS/1/diag.png"/>
+          <p:cNvPicPr>
+            <a:picLocks noChangeAspect="1" noChangeArrowheads="1"/>
+          </p:cNvPicPr>
+          <p:nvPr/>
+        </p:nvPicPr>
+        <p:blipFill rotWithShape="1">
+          <a:blip r:embed="rId2">
+            <a:extLst>
+              <a:ext uri="{28A0092B-C50C-407E-A947-70E740481C1C}">
+                <a14:useLocalDpi xmlns:a14="http://schemas.microsoft.com/office/drawing/2010/main" val="0"/>
+              </a:ext>
+            </a:extLst>
+          </a:blip>
+          <a:srcRect l="1631" t="1715" r="136" b="3372"/>
+          <a:stretch/>
+        </p:blipFill>
+        <p:spPr bwMode="auto">
+          <a:xfrm>
+            <a:off x="557212" y="1847851"/>
+            <a:ext cx="6886575" cy="4743450"/>
+          </a:xfrm>
+          <a:prstGeom prst="rect">
+            <a:avLst/>
+          </a:prstGeom>
+          <a:noFill/>
+          <a:extLst>
+            <a:ext uri="{909E8E84-426E-40DD-AFC4-6F175D3DCCD1}">
+              <a14:hiddenFill xmlns:a14="http://schemas.microsoft.com/office/drawing/2010/main">
+                <a:solidFill>
+                  <a:srgbClr val="FFFFFF"/>
+                </a:solidFill>
+              </a14:hiddenFill>
+            </a:ext>
+          </a:extLst>
+        </p:spPr>
+      </p:pic>
     </p:spTree>
     <p:extLst>
       <p:ext uri="{BB962C8B-B14F-4D97-AF65-F5344CB8AC3E}">
-        <p14:creationId xmlns:p14="http://schemas.microsoft.com/office/powerpoint/2010/main" val="4199720749"/>
+        <p14:creationId xmlns:p14="http://schemas.microsoft.com/office/powerpoint/2010/main" val="877635752"/>
       </p:ext>
     </p:extLst>
   </p:cSld>
@@ -4518,11 +4495,7 @@
           <a:p>
             <a:r>
               <a:rPr lang="en-US" dirty="0" smtClean="0"/>
-              <a:t>Views and </a:t>
-            </a:r>
-            <a:r>
-              <a:rPr lang="en-US" dirty="0" err="1" smtClean="0"/>
-              <a:t>ROutes</a:t>
+              <a:t>Controllers </a:t>
             </a:r>
             <a:endParaRPr lang="en-US" dirty="0"/>
           </a:p>
@@ -4538,115 +4511,104 @@
             <p:ph idx="1"/>
           </p:nvPr>
         </p:nvSpPr>
-        <p:spPr/>
-        <p:txBody>
-          <a:bodyPr/>
+        <p:spPr>
+          <a:xfrm>
+            <a:off x="457200" y="1609416"/>
+            <a:ext cx="7239000" cy="4715184"/>
+          </a:xfrm>
+        </p:spPr>
+        <p:txBody>
+          <a:bodyPr>
+            <a:normAutofit/>
+          </a:bodyPr>
           <a:lstStyle/>
           <a:p>
             <a:r>
-              <a:rPr lang="en-US" dirty="0" smtClean="0"/>
-              <a:t>Views</a:t>
+              <a:rPr lang="en-US" b="1" dirty="0" err="1" smtClean="0"/>
+              <a:t>ngController</a:t>
+            </a:r>
+            <a:endParaRPr lang="en-US" b="1" dirty="0" smtClean="0"/>
+          </a:p>
+          <a:p>
+            <a:endParaRPr lang="en-US" b="1" dirty="0" smtClean="0"/>
+          </a:p>
+          <a:p>
+            <a:r>
+              <a:rPr lang="en-US" dirty="0" smtClean="0"/>
+              <a:t>Constructor </a:t>
+            </a:r>
+            <a:r>
+              <a:rPr lang="en-US" dirty="0" smtClean="0"/>
+              <a:t>function used to augment </a:t>
+            </a:r>
+            <a:r>
+              <a:rPr lang="en-US" dirty="0" smtClean="0"/>
+              <a:t>$scope (you can think of it as the </a:t>
+            </a:r>
+            <a:r>
+              <a:rPr lang="en-US" dirty="0" smtClean="0"/>
+              <a:t>v</a:t>
+            </a:r>
+            <a:r>
+              <a:rPr lang="en-US" dirty="0" smtClean="0"/>
+              <a:t>iew model</a:t>
+            </a:r>
+            <a:r>
+              <a:rPr lang="en-US" dirty="0" smtClean="0"/>
+              <a:t>)</a:t>
+            </a:r>
+          </a:p>
+          <a:p>
+            <a:r>
+              <a:rPr lang="en-US" dirty="0" smtClean="0"/>
+              <a:t>When to use controller:</a:t>
             </a:r>
           </a:p>
           <a:p>
             <a:pPr lvl="1"/>
             <a:r>
               <a:rPr lang="en-US" dirty="0" smtClean="0"/>
-              <a:t>No </a:t>
-            </a:r>
-            <a:r>
-              <a:rPr lang="en-US" dirty="0" err="1" smtClean="0"/>
-              <a:t>templating</a:t>
-            </a:r>
-            <a:r>
-              <a:rPr lang="en-US" dirty="0" smtClean="0"/>
-              <a:t> engine</a:t>
+              <a:t>Use controllers to set initial state of $scope</a:t>
             </a:r>
           </a:p>
           <a:p>
             <a:pPr lvl="1"/>
             <a:r>
               <a:rPr lang="en-US" dirty="0" smtClean="0"/>
-              <a:t>Just HTML!</a:t>
-            </a:r>
-          </a:p>
-          <a:p>
+              <a:t>Add behaviors to $scope </a:t>
+            </a:r>
+          </a:p>
+          <a:p>
+            <a:r>
+              <a:rPr lang="en-US" dirty="0" smtClean="0"/>
+              <a:t>This is where your imperative logic belongs to</a:t>
+            </a:r>
+            <a:r>
+              <a:rPr lang="en-US" dirty="0" smtClean="0"/>
+              <a:t>!</a:t>
+            </a:r>
+          </a:p>
+          <a:p>
+            <a:r>
+              <a:rPr lang="en-US" dirty="0" smtClean="0">
+                <a:hlinkClick r:id="rId2"/>
+              </a:rPr>
+              <a:t>Simple e</a:t>
+            </a:r>
+            <a:r>
+              <a:rPr lang="en-US" dirty="0" smtClean="0">
+                <a:hlinkClick r:id="rId2"/>
+              </a:rPr>
+              <a:t>xample of controllers</a:t>
+            </a:r>
             <a:endParaRPr lang="en-US" dirty="0" smtClean="0"/>
-          </a:p>
-          <a:p>
-            <a:r>
-              <a:rPr lang="en-US" dirty="0" smtClean="0"/>
-              <a:t>Routes (</a:t>
-            </a:r>
-            <a:r>
-              <a:rPr lang="en-US" dirty="0" err="1" smtClean="0"/>
-              <a:t>ngRoute</a:t>
-            </a:r>
-            <a:r>
-              <a:rPr lang="en-US" dirty="0" smtClean="0"/>
-              <a:t>)</a:t>
-            </a:r>
-          </a:p>
-          <a:p>
-            <a:pPr lvl="1"/>
-            <a:r>
-              <a:rPr lang="en-US" dirty="0" smtClean="0"/>
-              <a:t>Very much similar to Backbone’s router</a:t>
-            </a:r>
-          </a:p>
-          <a:p>
-            <a:pPr lvl="1"/>
-            <a:r>
-              <a:rPr lang="en-US" dirty="0" err="1" smtClean="0"/>
-              <a:t>ngRoute</a:t>
-            </a:r>
-            <a:r>
-              <a:rPr lang="en-US" dirty="0" smtClean="0"/>
-              <a:t> only allows one view per page</a:t>
-            </a:r>
-          </a:p>
-          <a:p>
-            <a:pPr lvl="1"/>
-            <a:r>
-              <a:rPr lang="en-US" dirty="0" smtClean="0"/>
-              <a:t>In summary, no support for multiple views and nested views</a:t>
-            </a:r>
-          </a:p>
-          <a:p>
-            <a:pPr lvl="1"/>
-            <a:r>
-              <a:rPr lang="en-US" dirty="0" smtClean="0"/>
-              <a:t>Use 3</a:t>
-            </a:r>
-            <a:r>
-              <a:rPr lang="en-US" baseline="30000" dirty="0" smtClean="0"/>
-              <a:t>rd</a:t>
-            </a:r>
-            <a:r>
-              <a:rPr lang="en-US" dirty="0" smtClean="0"/>
-              <a:t> party library instead (UI-Router)</a:t>
-            </a:r>
-            <a:endParaRPr lang="en-US" dirty="0"/>
-          </a:p>
-          <a:p>
-            <a:pPr marL="292608" lvl="1" indent="0">
-              <a:buNone/>
-            </a:pPr>
-            <a:r>
-              <a:rPr lang="en-US" dirty="0" smtClean="0"/>
-              <a:t>		</a:t>
-            </a:r>
-          </a:p>
-          <a:p>
-            <a:pPr lvl="1"/>
-            <a:endParaRPr lang="en-US" dirty="0"/>
           </a:p>
         </p:txBody>
       </p:sp>
     </p:spTree>
     <p:extLst>
       <p:ext uri="{BB962C8B-B14F-4D97-AF65-F5344CB8AC3E}">
-        <p14:creationId xmlns:p14="http://schemas.microsoft.com/office/powerpoint/2010/main" val="3591969599"/>
+        <p14:creationId xmlns:p14="http://schemas.microsoft.com/office/powerpoint/2010/main" val="4199720749"/>
       </p:ext>
     </p:extLst>
   </p:cSld>
@@ -4697,6 +4659,194 @@
           <a:p>
             <a:r>
               <a:rPr lang="en-US" dirty="0" smtClean="0"/>
+              <a:t>Views and </a:t>
+            </a:r>
+            <a:r>
+              <a:rPr lang="en-US" dirty="0" err="1" smtClean="0"/>
+              <a:t>ROutes</a:t>
+            </a:r>
+            <a:endParaRPr lang="en-US" dirty="0"/>
+          </a:p>
+        </p:txBody>
+      </p:sp>
+      <p:sp>
+        <p:nvSpPr>
+          <p:cNvPr id="3" name="Content Placeholder 2"/>
+          <p:cNvSpPr>
+            <a:spLocks noGrp="1"/>
+          </p:cNvSpPr>
+          <p:nvPr>
+            <p:ph idx="1"/>
+          </p:nvPr>
+        </p:nvSpPr>
+        <p:spPr/>
+        <p:txBody>
+          <a:bodyPr/>
+          <a:lstStyle/>
+          <a:p>
+            <a:r>
+              <a:rPr lang="en-US" dirty="0" smtClean="0"/>
+              <a:t>Views (</a:t>
+            </a:r>
+            <a:r>
+              <a:rPr lang="en-US" dirty="0" err="1" smtClean="0"/>
+              <a:t>ngView</a:t>
+            </a:r>
+            <a:r>
+              <a:rPr lang="en-US" dirty="0" smtClean="0"/>
+              <a:t>)</a:t>
+            </a:r>
+            <a:endParaRPr lang="en-US" dirty="0" smtClean="0"/>
+          </a:p>
+          <a:p>
+            <a:pPr lvl="1"/>
+            <a:r>
+              <a:rPr lang="en-US" dirty="0" smtClean="0"/>
+              <a:t>No </a:t>
+            </a:r>
+            <a:r>
+              <a:rPr lang="en-US" dirty="0" err="1" smtClean="0"/>
+              <a:t>templating</a:t>
+            </a:r>
+            <a:r>
+              <a:rPr lang="en-US" dirty="0" smtClean="0"/>
+              <a:t> engine</a:t>
+            </a:r>
+          </a:p>
+          <a:p>
+            <a:pPr lvl="1"/>
+            <a:r>
+              <a:rPr lang="en-US" dirty="0" smtClean="0"/>
+              <a:t>Just HTML!</a:t>
+            </a:r>
+          </a:p>
+          <a:p>
+            <a:endParaRPr lang="en-US" dirty="0" smtClean="0"/>
+          </a:p>
+          <a:p>
+            <a:r>
+              <a:rPr lang="en-US" dirty="0" smtClean="0"/>
+              <a:t>Routes (</a:t>
+            </a:r>
+            <a:r>
+              <a:rPr lang="en-US" dirty="0" err="1" smtClean="0"/>
+              <a:t>ngRoute</a:t>
+            </a:r>
+            <a:r>
+              <a:rPr lang="en-US" dirty="0" smtClean="0"/>
+              <a:t>)</a:t>
+            </a:r>
+          </a:p>
+          <a:p>
+            <a:pPr lvl="1"/>
+            <a:r>
+              <a:rPr lang="en-US" dirty="0" smtClean="0"/>
+              <a:t>Very much similar to Backbone’s router</a:t>
+            </a:r>
+          </a:p>
+          <a:p>
+            <a:pPr lvl="1"/>
+            <a:r>
+              <a:rPr lang="en-US" dirty="0" err="1" smtClean="0"/>
+              <a:t>ngRoute</a:t>
+            </a:r>
+            <a:r>
+              <a:rPr lang="en-US" dirty="0" smtClean="0"/>
+              <a:t> only allows one view per page</a:t>
+            </a:r>
+          </a:p>
+          <a:p>
+            <a:pPr lvl="1"/>
+            <a:r>
+              <a:rPr lang="en-US" dirty="0" smtClean="0"/>
+              <a:t>In summary, no support for multiple views and nested views</a:t>
+            </a:r>
+          </a:p>
+          <a:p>
+            <a:pPr lvl="1"/>
+            <a:r>
+              <a:rPr lang="en-US" dirty="0" smtClean="0"/>
+              <a:t>Use 3</a:t>
+            </a:r>
+            <a:r>
+              <a:rPr lang="en-US" baseline="30000" dirty="0" smtClean="0"/>
+              <a:t>rd</a:t>
+            </a:r>
+            <a:r>
+              <a:rPr lang="en-US" dirty="0" smtClean="0"/>
+              <a:t> party library instead (UI-Router)</a:t>
+            </a:r>
+            <a:endParaRPr lang="en-US" dirty="0"/>
+          </a:p>
+          <a:p>
+            <a:pPr marL="292608" lvl="1" indent="0">
+              <a:buNone/>
+            </a:pPr>
+            <a:r>
+              <a:rPr lang="en-US" dirty="0" smtClean="0"/>
+              <a:t>		</a:t>
+            </a:r>
+          </a:p>
+          <a:p>
+            <a:pPr lvl="1"/>
+            <a:endParaRPr lang="en-US" dirty="0"/>
+          </a:p>
+        </p:txBody>
+      </p:sp>
+    </p:spTree>
+    <p:extLst>
+      <p:ext uri="{BB962C8B-B14F-4D97-AF65-F5344CB8AC3E}">
+        <p14:creationId xmlns:p14="http://schemas.microsoft.com/office/powerpoint/2010/main" val="3591969599"/>
+      </p:ext>
+    </p:extLst>
+  </p:cSld>
+  <p:clrMapOvr>
+    <a:masterClrMapping/>
+  </p:clrMapOvr>
+  <p:timing>
+    <p:tnLst>
+      <p:par>
+        <p:cTn id="1" dur="indefinite" restart="never" nodeType="tmRoot"/>
+      </p:par>
+    </p:tnLst>
+  </p:timing>
+</p:sld>
+</file>
+
+<file path=ppt/slides/slide13.xml><?xml version="1.0" encoding="utf-8"?>
+<p:sld xmlns:a="http://schemas.openxmlformats.org/drawingml/2006/main" xmlns:r="http://schemas.openxmlformats.org/officeDocument/2006/relationships" xmlns:p="http://schemas.openxmlformats.org/presentationml/2006/main">
+  <p:cSld>
+    <p:spTree>
+      <p:nvGrpSpPr>
+        <p:cNvPr id="1" name=""/>
+        <p:cNvGrpSpPr/>
+        <p:nvPr/>
+      </p:nvGrpSpPr>
+      <p:grpSpPr>
+        <a:xfrm>
+          <a:off x="0" y="0"/>
+          <a:ext cx="0" cy="0"/>
+          <a:chOff x="0" y="0"/>
+          <a:chExt cx="0" cy="0"/>
+        </a:xfrm>
+      </p:grpSpPr>
+      <p:sp>
+        <p:nvSpPr>
+          <p:cNvPr id="2" name="Title 1"/>
+          <p:cNvSpPr>
+            <a:spLocks noGrp="1"/>
+          </p:cNvSpPr>
+          <p:nvPr>
+            <p:ph type="title"/>
+          </p:nvPr>
+        </p:nvSpPr>
+        <p:spPr/>
+        <p:txBody>
+          <a:bodyPr/>
+          <a:lstStyle/>
+          <a:p>
+            <a:r>
+              <a:rPr lang="en-US" dirty="0" smtClean="0"/>
               <a:t>Directives</a:t>
             </a:r>
             <a:endParaRPr lang="en-US" dirty="0"/>
@@ -4733,7 +4883,19 @@
           <a:p>
             <a:r>
               <a:rPr lang="en-US" dirty="0" smtClean="0"/>
-              <a:t>Match by</a:t>
+              <a:t>Example: </a:t>
+            </a:r>
+            <a:r>
+              <a:rPr lang="en-US" dirty="0" err="1" smtClean="0"/>
+              <a:t>datePicker</a:t>
+            </a:r>
+            <a:r>
+              <a:rPr lang="en-US" dirty="0" smtClean="0"/>
+              <a:t>  is matched </a:t>
+            </a:r>
+            <a:r>
+              <a:rPr lang="en-US" dirty="0" smtClean="0"/>
+              <a:t>by</a:t>
             </a:r>
           </a:p>
           <a:p>
@@ -4763,7 +4925,15 @@
           <a:p>
             <a:r>
               <a:rPr lang="en-US" dirty="0" smtClean="0"/>
-              <a:t>No more this:</a:t>
+              <a:t>No more </a:t>
+            </a:r>
+            <a:r>
+              <a:rPr lang="en-US" dirty="0" smtClean="0"/>
+              <a:t>of this</a:t>
+            </a:r>
+            <a:r>
+              <a:rPr lang="en-US" dirty="0" smtClean="0"/>
+              <a:t>:</a:t>
             </a:r>
           </a:p>
           <a:p>
@@ -4815,7 +4985,7 @@
         </p:blipFill>
         <p:spPr bwMode="auto">
           <a:xfrm>
-            <a:off x="3276600" y="4343400"/>
+            <a:off x="3581400" y="4343400"/>
             <a:ext cx="3581400" cy="2231488"/>
           </a:xfrm>
           <a:prstGeom prst="rect">
@@ -4866,159 +5036,6 @@
 </p:sld>
 </file>
 
-<file path=ppt/slides/slide13.xml><?xml version="1.0" encoding="utf-8"?>
-<p:sld xmlns:a="http://schemas.openxmlformats.org/drawingml/2006/main" xmlns:r="http://schemas.openxmlformats.org/officeDocument/2006/relationships" xmlns:p="http://schemas.openxmlformats.org/presentationml/2006/main">
-  <p:cSld>
-    <p:spTree>
-      <p:nvGrpSpPr>
-        <p:cNvPr id="1" name=""/>
-        <p:cNvGrpSpPr/>
-        <p:nvPr/>
-      </p:nvGrpSpPr>
-      <p:grpSpPr>
-        <a:xfrm>
-          <a:off x="0" y="0"/>
-          <a:ext cx="0" cy="0"/>
-          <a:chOff x="0" y="0"/>
-          <a:chExt cx="0" cy="0"/>
-        </a:xfrm>
-      </p:grpSpPr>
-      <p:sp>
-        <p:nvSpPr>
-          <p:cNvPr id="2" name="Title 1"/>
-          <p:cNvSpPr>
-            <a:spLocks noGrp="1"/>
-          </p:cNvSpPr>
-          <p:nvPr>
-            <p:ph type="title"/>
-          </p:nvPr>
-        </p:nvSpPr>
-        <p:spPr/>
-        <p:txBody>
-          <a:bodyPr/>
-          <a:lstStyle/>
-          <a:p>
-            <a:r>
-              <a:rPr lang="en-US" dirty="0" smtClean="0"/>
-              <a:t>Directives (</a:t>
-            </a:r>
-            <a:r>
-              <a:rPr lang="en-US" dirty="0" err="1" smtClean="0"/>
-              <a:t>Cont</a:t>
-            </a:r>
-            <a:r>
-              <a:rPr lang="en-US" dirty="0" smtClean="0"/>
-              <a:t>’)</a:t>
-            </a:r>
-            <a:endParaRPr lang="en-US" dirty="0"/>
-          </a:p>
-        </p:txBody>
-      </p:sp>
-      <p:sp>
-        <p:nvSpPr>
-          <p:cNvPr id="3" name="Content Placeholder 2"/>
-          <p:cNvSpPr>
-            <a:spLocks noGrp="1"/>
-          </p:cNvSpPr>
-          <p:nvPr>
-            <p:ph idx="1"/>
-          </p:nvPr>
-        </p:nvSpPr>
-        <p:spPr/>
-        <p:txBody>
-          <a:bodyPr/>
-          <a:lstStyle/>
-          <a:p>
-            <a:r>
-              <a:rPr lang="en-US" dirty="0"/>
-              <a:t>Functionality associated to these elements are declared in the directive</a:t>
-            </a:r>
-          </a:p>
-          <a:p>
-            <a:endParaRPr lang="en-US" dirty="0" smtClean="0"/>
-          </a:p>
-          <a:p>
-            <a:r>
-              <a:rPr lang="en-US" dirty="0" smtClean="0"/>
-              <a:t>Templates </a:t>
-            </a:r>
-            <a:r>
-              <a:rPr lang="en-US" dirty="0"/>
-              <a:t>can also be included here</a:t>
-            </a:r>
-          </a:p>
-          <a:p>
-            <a:pPr lvl="1"/>
-            <a:r>
-              <a:rPr lang="en-US" dirty="0"/>
-              <a:t>We can create nested views using directives</a:t>
-            </a:r>
-          </a:p>
-          <a:p>
-            <a:endParaRPr lang="en-US" dirty="0" smtClean="0"/>
-          </a:p>
-          <a:p>
-            <a:r>
-              <a:rPr lang="en-US" dirty="0" smtClean="0"/>
-              <a:t>Declarative </a:t>
-            </a:r>
-            <a:r>
-              <a:rPr lang="en-US" dirty="0"/>
-              <a:t>logic placed here</a:t>
-            </a:r>
-          </a:p>
-          <a:p>
-            <a:pPr lvl="1"/>
-            <a:r>
-              <a:rPr lang="en-US" dirty="0"/>
-              <a:t>DOM manipulation as well!</a:t>
-            </a:r>
-          </a:p>
-          <a:p>
-            <a:endParaRPr lang="en-US" dirty="0" smtClean="0">
-              <a:hlinkClick r:id="rId2"/>
-            </a:endParaRPr>
-          </a:p>
-          <a:p>
-            <a:r>
-              <a:rPr lang="en-US" dirty="0" smtClean="0">
-                <a:hlinkClick r:id="rId2"/>
-              </a:rPr>
-              <a:t>Example </a:t>
-            </a:r>
-            <a:r>
-              <a:rPr lang="en-US" dirty="0">
-                <a:hlinkClick r:id="rId2"/>
-              </a:rPr>
-              <a:t>of Directive</a:t>
-            </a:r>
-            <a:endParaRPr lang="en-US" dirty="0"/>
-          </a:p>
-          <a:p>
-            <a:endParaRPr lang="en-US" dirty="0"/>
-          </a:p>
-        </p:txBody>
-      </p:sp>
-    </p:spTree>
-    <p:extLst>
-      <p:ext uri="{BB962C8B-B14F-4D97-AF65-F5344CB8AC3E}">
-        <p14:creationId xmlns:p14="http://schemas.microsoft.com/office/powerpoint/2010/main" val="801366631"/>
-      </p:ext>
-    </p:extLst>
-  </p:cSld>
-  <p:clrMapOvr>
-    <a:masterClrMapping/>
-  </p:clrMapOvr>
-  <p:timing>
-    <p:tnLst>
-      <p:par>
-        <p:cTn id="1" dur="indefinite" restart="never" nodeType="tmRoot"/>
-      </p:par>
-    </p:tnLst>
-  </p:timing>
-</p:sld>
-</file>
-
 <file path=ppt/slides/slide14.xml><?xml version="1.0" encoding="utf-8"?>
 <p:sld xmlns:a="http://schemas.openxmlformats.org/drawingml/2006/main" xmlns:r="http://schemas.openxmlformats.org/officeDocument/2006/relationships" xmlns:p="http://schemas.openxmlformats.org/presentationml/2006/main">
   <p:cSld>
@@ -5053,7 +5070,15 @@
           <a:p>
             <a:r>
               <a:rPr lang="en-US" dirty="0" smtClean="0"/>
-              <a:t>Services</a:t>
+              <a:t>Directives (</a:t>
+            </a:r>
+            <a:r>
+              <a:rPr lang="en-US" dirty="0" err="1" smtClean="0"/>
+              <a:t>Cont</a:t>
+            </a:r>
+            <a:r>
+              <a:rPr lang="en-US" dirty="0" smtClean="0"/>
+              <a:t>’)</a:t>
             </a:r>
             <a:endParaRPr lang="en-US" dirty="0"/>
           </a:p>
@@ -5075,36 +5100,67 @@
           <a:lstStyle/>
           <a:p>
             <a:r>
-              <a:rPr lang="en-US" dirty="0" smtClean="0"/>
-              <a:t>Functions that isn’t involved with the MVC</a:t>
-            </a:r>
-          </a:p>
-          <a:p>
-            <a:endParaRPr lang="en-US" dirty="0"/>
-          </a:p>
-          <a:p>
-            <a:r>
-              <a:rPr lang="en-US" dirty="0" smtClean="0"/>
-              <a:t>It’s where you put code that doesn’t fit in Controllers or Directives</a:t>
-            </a:r>
-          </a:p>
-          <a:p>
-            <a:pPr marL="292608" lvl="1" indent="0">
-              <a:buNone/>
-            </a:pPr>
-            <a:endParaRPr lang="en-US" dirty="0"/>
-          </a:p>
-          <a:p>
-            <a:r>
-              <a:rPr lang="en-US" dirty="0" smtClean="0"/>
-              <a:t>Use it for shared code across application</a:t>
+              <a:rPr lang="en-US" dirty="0"/>
+              <a:t>Functionality associated to these elements are declared in the directive</a:t>
+            </a:r>
+          </a:p>
+          <a:p>
+            <a:endParaRPr lang="en-US" dirty="0" smtClean="0"/>
+          </a:p>
+          <a:p>
+            <a:r>
+              <a:rPr lang="en-US" dirty="0" smtClean="0"/>
+              <a:t>Templates </a:t>
+            </a:r>
+            <a:r>
+              <a:rPr lang="en-US" dirty="0"/>
+              <a:t>can also be included here</a:t>
             </a:r>
           </a:p>
           <a:p>
             <a:pPr lvl="1"/>
             <a:r>
-              <a:rPr lang="en-US" dirty="0" smtClean="0"/>
-              <a:t>Simply inject the service into your components</a:t>
+              <a:rPr lang="en-US" dirty="0"/>
+              <a:t>We can create nested views using directives</a:t>
+            </a:r>
+          </a:p>
+          <a:p>
+            <a:endParaRPr lang="en-US" dirty="0" smtClean="0"/>
+          </a:p>
+          <a:p>
+            <a:r>
+              <a:rPr lang="en-US" dirty="0" smtClean="0"/>
+              <a:t>Declarative </a:t>
+            </a:r>
+            <a:r>
+              <a:rPr lang="en-US" dirty="0"/>
+              <a:t>logic placed here</a:t>
+            </a:r>
+          </a:p>
+          <a:p>
+            <a:pPr lvl="1"/>
+            <a:r>
+              <a:rPr lang="en-US" dirty="0"/>
+              <a:t>DOM manipulation as well!</a:t>
+            </a:r>
+          </a:p>
+          <a:p>
+            <a:endParaRPr lang="en-US" dirty="0" smtClean="0">
+              <a:hlinkClick r:id="rId2"/>
+            </a:endParaRPr>
+          </a:p>
+          <a:p>
+            <a:r>
+              <a:rPr lang="en-US" dirty="0" smtClean="0">
+                <a:hlinkClick r:id="rId2"/>
+              </a:rPr>
+              <a:t>Example </a:t>
+            </a:r>
+            <a:r>
+              <a:rPr lang="en-US" dirty="0">
+                <a:hlinkClick r:id="rId2"/>
+              </a:rPr>
+              <a:t>of Directive</a:t>
             </a:r>
             <a:endParaRPr lang="en-US" dirty="0"/>
           </a:p>
@@ -5116,7 +5172,7 @@
     </p:spTree>
     <p:extLst>
       <p:ext uri="{BB962C8B-B14F-4D97-AF65-F5344CB8AC3E}">
-        <p14:creationId xmlns:p14="http://schemas.microsoft.com/office/powerpoint/2010/main" val="2094424577"/>
+        <p14:creationId xmlns:p14="http://schemas.microsoft.com/office/powerpoint/2010/main" val="801366631"/>
       </p:ext>
     </p:extLst>
   </p:cSld>
@@ -5167,55 +5223,70 @@
           <a:p>
             <a:r>
               <a:rPr lang="en-US" dirty="0" smtClean="0"/>
-              <a:t>Angular Components</a:t>
+              <a:t>Services</a:t>
             </a:r>
             <a:endParaRPr lang="en-US" dirty="0"/>
           </a:p>
         </p:txBody>
       </p:sp>
-      <p:pic>
-        <p:nvPicPr>
-          <p:cNvPr id="5122" name="Picture 2" descr="http://www.adevedo.com/Articles_images/AngularJS/1/diag.png"/>
-          <p:cNvPicPr>
-            <a:picLocks noChangeAspect="1" noChangeArrowheads="1"/>
-          </p:cNvPicPr>
-          <p:nvPr/>
-        </p:nvPicPr>
-        <p:blipFill rotWithShape="1">
-          <a:blip r:embed="rId2">
-            <a:extLst>
-              <a:ext uri="{28A0092B-C50C-407E-A947-70E740481C1C}">
-                <a14:useLocalDpi xmlns:a14="http://schemas.microsoft.com/office/drawing/2010/main" val="0"/>
-              </a:ext>
-            </a:extLst>
-          </a:blip>
-          <a:srcRect l="1631" t="1715" r="136" b="3372"/>
-          <a:stretch/>
-        </p:blipFill>
-        <p:spPr bwMode="auto">
-          <a:xfrm>
-            <a:off x="504825" y="1828801"/>
-            <a:ext cx="6886575" cy="4743450"/>
-          </a:xfrm>
-          <a:prstGeom prst="rect">
-            <a:avLst/>
-          </a:prstGeom>
-          <a:noFill/>
-          <a:extLst>
-            <a:ext uri="{909E8E84-426E-40DD-AFC4-6F175D3DCCD1}">
-              <a14:hiddenFill xmlns:a14="http://schemas.microsoft.com/office/drawing/2010/main">
-                <a:solidFill>
-                  <a:srgbClr val="FFFFFF"/>
-                </a:solidFill>
-              </a14:hiddenFill>
-            </a:ext>
-          </a:extLst>
-        </p:spPr>
-      </p:pic>
+      <p:sp>
+        <p:nvSpPr>
+          <p:cNvPr id="3" name="Content Placeholder 2"/>
+          <p:cNvSpPr>
+            <a:spLocks noGrp="1"/>
+          </p:cNvSpPr>
+          <p:nvPr>
+            <p:ph idx="1"/>
+          </p:nvPr>
+        </p:nvSpPr>
+        <p:spPr/>
+        <p:txBody>
+          <a:bodyPr/>
+          <a:lstStyle/>
+          <a:p>
+            <a:r>
+              <a:rPr lang="en-US" dirty="0" smtClean="0"/>
+              <a:t>Functions that isn’t involved with the MVC</a:t>
+            </a:r>
+          </a:p>
+          <a:p>
+            <a:endParaRPr lang="en-US" dirty="0"/>
+          </a:p>
+          <a:p>
+            <a:r>
+              <a:rPr lang="en-US" dirty="0" smtClean="0"/>
+              <a:t>It’s where you put code that doesn’t fit in Controllers or Directives</a:t>
+            </a:r>
+          </a:p>
+          <a:p>
+            <a:pPr marL="292608" lvl="1" indent="0">
+              <a:buNone/>
+            </a:pPr>
+            <a:endParaRPr lang="en-US" dirty="0"/>
+          </a:p>
+          <a:p>
+            <a:r>
+              <a:rPr lang="en-US" dirty="0" smtClean="0"/>
+              <a:t>Use it for shared code across application</a:t>
+            </a:r>
+          </a:p>
+          <a:p>
+            <a:pPr lvl="1"/>
+            <a:r>
+              <a:rPr lang="en-US" dirty="0" smtClean="0"/>
+              <a:t>Simply inject the service into your components</a:t>
+            </a:r>
+            <a:endParaRPr lang="en-US" dirty="0"/>
+          </a:p>
+          <a:p>
+            <a:endParaRPr lang="en-US" dirty="0"/>
+          </a:p>
+        </p:txBody>
+      </p:sp>
     </p:spTree>
     <p:extLst>
       <p:ext uri="{BB962C8B-B14F-4D97-AF65-F5344CB8AC3E}">
-        <p14:creationId xmlns:p14="http://schemas.microsoft.com/office/powerpoint/2010/main" val="877635752"/>
+        <p14:creationId xmlns:p14="http://schemas.microsoft.com/office/powerpoint/2010/main" val="2094424577"/>
       </p:ext>
     </p:extLst>
   </p:cSld>
@@ -5284,7 +5355,9 @@
         </p:nvSpPr>
         <p:spPr/>
         <p:txBody>
-          <a:bodyPr/>
+          <a:bodyPr>
+            <a:normAutofit/>
+          </a:bodyPr>
           <a:lstStyle/>
           <a:p>
             <a:r>
@@ -5311,8 +5384,21 @@
             <a:pPr lvl="1"/>
             <a:r>
               <a:rPr lang="en-US" dirty="0" smtClean="0"/>
-              <a:t>To test modules, we just inject mock data</a:t>
-            </a:r>
+              <a:t>To test modules, we </a:t>
+            </a:r>
+            <a:r>
+              <a:rPr lang="en-US" dirty="0" smtClean="0"/>
+              <a:t>can just </a:t>
+            </a:r>
+            <a:r>
+              <a:rPr lang="en-US" dirty="0" smtClean="0"/>
+              <a:t>inject mock </a:t>
+            </a:r>
+            <a:r>
+              <a:rPr lang="en-US" dirty="0" smtClean="0"/>
+              <a:t>data, on a test by test basis</a:t>
+            </a:r>
+            <a:endParaRPr lang="en-US" dirty="0" smtClean="0"/>
           </a:p>
           <a:p>
             <a:endParaRPr lang="en-US" dirty="0" smtClean="0"/>
@@ -5436,7 +5522,7 @@
         </p:nvSpPr>
         <p:spPr>
           <a:xfrm>
-            <a:off x="5105400" y="1600200"/>
+            <a:off x="5200650" y="1647825"/>
             <a:ext cx="2895600" cy="4846320"/>
           </a:xfrm>
         </p:spPr>
@@ -5448,6 +5534,14 @@
               <a:rPr lang="en-US" dirty="0" smtClean="0"/>
               <a:t>Good separation of concerns </a:t>
             </a:r>
+            <a:endParaRPr lang="en-US" dirty="0" smtClean="0"/>
+          </a:p>
+          <a:p>
+            <a:r>
+              <a:rPr lang="en-US" dirty="0" smtClean="0"/>
+              <a:t>Two-way data-binding!!!</a:t>
+            </a:r>
+            <a:endParaRPr lang="en-US" dirty="0" smtClean="0"/>
           </a:p>
           <a:p>
             <a:r>
@@ -5490,7 +5584,7 @@
         </p:blipFill>
         <p:spPr bwMode="auto">
           <a:xfrm>
-            <a:off x="0" y="1676400"/>
+            <a:off x="0" y="1714500"/>
             <a:ext cx="5191125" cy="5143500"/>
           </a:xfrm>
           <a:prstGeom prst="rect">
@@ -5586,13 +5680,17 @@
         </p:spPr>
         <p:txBody>
           <a:bodyPr>
-            <a:normAutofit fontScale="92500" lnSpcReduction="20000"/>
+            <a:normAutofit/>
           </a:bodyPr>
           <a:lstStyle/>
           <a:p>
             <a:r>
               <a:rPr lang="en-US" dirty="0" smtClean="0"/>
-              <a:t>Useful Links</a:t>
+              <a:t>Useful </a:t>
+            </a:r>
+            <a:r>
+              <a:rPr lang="en-US" dirty="0" smtClean="0"/>
+              <a:t>Links and Articles</a:t>
             </a:r>
             <a:endParaRPr lang="en-US" dirty="0">
               <a:hlinkClick r:id="rId2"/>
@@ -5616,7 +5714,13 @@
               <a:rPr lang="en-US" dirty="0" smtClean="0">
                 <a:hlinkClick r:id="rId2"/>
               </a:rPr>
-              <a:t>, Backbone.js and Ember.js</a:t>
+              <a:t>, Backbone.js and </a:t>
+            </a:r>
+            <a:r>
+              <a:rPr lang="en-US" dirty="0" smtClean="0">
+                <a:hlinkClick r:id="rId2"/>
+              </a:rPr>
+              <a:t>Ember.js</a:t>
             </a:r>
             <a:endParaRPr lang="en-US" dirty="0" smtClean="0"/>
           </a:p>
@@ -5632,7 +5736,10 @@
               </a:rPr>
               <a:t>Nesting Directives</a:t>
             </a:r>
-            <a:endParaRPr lang="en-US" dirty="0" smtClean="0"/>
+            <a:r>
+              <a:rPr lang="en-US" dirty="0" smtClean="0"/>
+              <a:t> </a:t>
+            </a:r>
           </a:p>
           <a:p>
             <a:pPr lvl="1"/>
@@ -5644,13 +5751,21 @@
               <a:rPr lang="en-US" dirty="0" smtClean="0">
                 <a:hlinkClick r:id="rId4"/>
               </a:rPr>
-              <a:t>A bit more information on the Digest Loop</a:t>
-            </a:r>
-            <a:endParaRPr lang="en-US" dirty="0" smtClean="0"/>
+              <a:t>Example of incorporating jQuery Dialogs into </a:t>
+            </a:r>
+            <a:r>
+              <a:rPr lang="en-US" dirty="0" err="1" smtClean="0">
+                <a:hlinkClick r:id="rId4"/>
+              </a:rPr>
+              <a:t>AngularJS</a:t>
+            </a:r>
+            <a:endParaRPr lang="en-US" dirty="0"/>
           </a:p>
           <a:p>
             <a:pPr lvl="1"/>
-            <a:endParaRPr lang="en-US" dirty="0" smtClean="0"/>
+            <a:endParaRPr lang="en-US" dirty="0" smtClean="0">
+              <a:hlinkClick r:id="rId5"/>
+            </a:endParaRPr>
           </a:p>
           <a:p>
             <a:pPr lvl="1"/>
@@ -5658,57 +5773,26 @@
               <a:rPr lang="en-US" dirty="0" smtClean="0">
                 <a:hlinkClick r:id="rId5"/>
               </a:rPr>
-              <a:t>Creating directives</a:t>
-            </a:r>
-            <a:r>
-              <a:rPr lang="en-US" dirty="0" smtClean="0"/>
-              <a:t> (there’s a broken link for the topic Isolate Scope. It can be found </a:t>
+              <a:t>A </a:t>
             </a:r>
             <a:r>
               <a:rPr lang="en-US" dirty="0" smtClean="0">
-                <a:hlinkClick r:id="rId6"/>
+                <a:hlinkClick r:id="rId5"/>
               </a:rPr>
-              <a:t>here</a:t>
-            </a:r>
-            <a:r>
-              <a:rPr lang="en-US" dirty="0" smtClean="0"/>
-              <a:t>)</a:t>
-            </a:r>
+              <a:t>bit more information on the Digest </a:t>
+            </a:r>
+            <a:r>
+              <a:rPr lang="en-US" dirty="0" smtClean="0">
+                <a:hlinkClick r:id="rId5"/>
+              </a:rPr>
+              <a:t>Loop</a:t>
+            </a:r>
+            <a:endParaRPr lang="en-US" dirty="0" smtClean="0"/>
           </a:p>
           <a:p>
             <a:pPr lvl="1"/>
-            <a:endParaRPr lang="en-US" dirty="0"/>
-          </a:p>
-          <a:p>
-            <a:pPr lvl="1"/>
-            <a:r>
-              <a:rPr lang="en-US" dirty="0" smtClean="0">
-                <a:hlinkClick r:id="rId7"/>
-              </a:rPr>
-              <a:t>Testing directives</a:t>
-            </a:r>
-            <a:endParaRPr lang="en-US" dirty="0" smtClean="0"/>
-          </a:p>
-          <a:p>
-            <a:pPr lvl="1"/>
-            <a:endParaRPr lang="en-US" dirty="0"/>
-          </a:p>
-          <a:p>
-            <a:pPr lvl="1"/>
-            <a:r>
-              <a:rPr lang="en-US" dirty="0">
-                <a:hlinkClick r:id="rId8"/>
-              </a:rPr>
-              <a:t>A good </a:t>
-            </a:r>
-            <a:r>
-              <a:rPr lang="en-US" dirty="0" smtClean="0">
-                <a:hlinkClick r:id="rId8"/>
-              </a:rPr>
-              <a:t>read on using jQuery in Angular</a:t>
-            </a:r>
-            <a:endParaRPr lang="en-US" dirty="0">
-              <a:hlinkClick r:id="rId2"/>
+            <a:endParaRPr lang="en-US" dirty="0" smtClean="0">
+              <a:hlinkClick r:id="rId6"/>
             </a:endParaRPr>
           </a:p>
           <a:p>
@@ -5721,6 +5805,193 @@
     <p:extLst>
       <p:ext uri="{BB962C8B-B14F-4D97-AF65-F5344CB8AC3E}">
         <p14:creationId xmlns:p14="http://schemas.microsoft.com/office/powerpoint/2010/main" val="2468968457"/>
+      </p:ext>
+    </p:extLst>
+  </p:cSld>
+  <p:clrMapOvr>
+    <a:masterClrMapping/>
+  </p:clrMapOvr>
+  <p:timing>
+    <p:tnLst>
+      <p:par>
+        <p:cTn id="1" dur="indefinite" restart="never" nodeType="tmRoot"/>
+      </p:par>
+    </p:tnLst>
+  </p:timing>
+</p:sld>
+</file>
+
+<file path=ppt/slides/slide19.xml><?xml version="1.0" encoding="utf-8"?>
+<p:sld xmlns:a="http://schemas.openxmlformats.org/drawingml/2006/main" xmlns:r="http://schemas.openxmlformats.org/officeDocument/2006/relationships" xmlns:p="http://schemas.openxmlformats.org/presentationml/2006/main">
+  <p:cSld>
+    <p:spTree>
+      <p:nvGrpSpPr>
+        <p:cNvPr id="1" name=""/>
+        <p:cNvGrpSpPr/>
+        <p:nvPr/>
+      </p:nvGrpSpPr>
+      <p:grpSpPr>
+        <a:xfrm>
+          <a:off x="0" y="0"/>
+          <a:ext cx="0" cy="0"/>
+          <a:chOff x="0" y="0"/>
+          <a:chExt cx="0" cy="0"/>
+        </a:xfrm>
+      </p:grpSpPr>
+      <p:sp>
+        <p:nvSpPr>
+          <p:cNvPr id="2" name="Title 1"/>
+          <p:cNvSpPr>
+            <a:spLocks noGrp="1"/>
+          </p:cNvSpPr>
+          <p:nvPr>
+            <p:ph type="title"/>
+          </p:nvPr>
+        </p:nvSpPr>
+        <p:spPr/>
+        <p:txBody>
+          <a:bodyPr/>
+          <a:lstStyle/>
+          <a:p>
+            <a:r>
+              <a:rPr lang="en-US" dirty="0" smtClean="0"/>
+              <a:t>More Links!</a:t>
+            </a:r>
+            <a:endParaRPr lang="en-US" dirty="0"/>
+          </a:p>
+        </p:txBody>
+      </p:sp>
+      <p:sp>
+        <p:nvSpPr>
+          <p:cNvPr id="3" name="Content Placeholder 2"/>
+          <p:cNvSpPr>
+            <a:spLocks noGrp="1"/>
+          </p:cNvSpPr>
+          <p:nvPr>
+            <p:ph idx="1"/>
+          </p:nvPr>
+        </p:nvSpPr>
+        <p:spPr/>
+        <p:txBody>
+          <a:bodyPr/>
+          <a:lstStyle/>
+          <a:p>
+            <a:pPr lvl="1"/>
+            <a:r>
+              <a:rPr lang="en-US" dirty="0">
+                <a:hlinkClick r:id="rId2"/>
+              </a:rPr>
+              <a:t>Creating directives</a:t>
+            </a:r>
+            <a:r>
+              <a:rPr lang="en-US" dirty="0"/>
+              <a:t> (there’s a broken link for the topic Isolate Scope. It can be found </a:t>
+            </a:r>
+            <a:r>
+              <a:rPr lang="en-US" dirty="0">
+                <a:hlinkClick r:id="rId3"/>
+              </a:rPr>
+              <a:t>here</a:t>
+            </a:r>
+            <a:r>
+              <a:rPr lang="en-US" dirty="0"/>
+              <a:t>)</a:t>
+            </a:r>
+          </a:p>
+          <a:p>
+            <a:pPr lvl="1"/>
+            <a:endParaRPr lang="en-US" dirty="0">
+              <a:hlinkClick r:id="rId4"/>
+            </a:endParaRPr>
+          </a:p>
+          <a:p>
+            <a:pPr lvl="1"/>
+            <a:r>
+              <a:rPr lang="en-US" dirty="0">
+                <a:hlinkClick r:id="rId4"/>
+              </a:rPr>
+              <a:t>Testing directives</a:t>
+            </a:r>
+            <a:endParaRPr lang="en-US" dirty="0"/>
+          </a:p>
+          <a:p>
+            <a:pPr lvl="1"/>
+            <a:endParaRPr lang="en-US" dirty="0">
+              <a:hlinkClick r:id="rId5"/>
+            </a:endParaRPr>
+          </a:p>
+          <a:p>
+            <a:pPr lvl="1"/>
+            <a:r>
+              <a:rPr lang="en-US" dirty="0">
+                <a:hlinkClick r:id="rId5"/>
+              </a:rPr>
+              <a:t>A good read on using jQuery in </a:t>
+            </a:r>
+            <a:r>
+              <a:rPr lang="en-US" dirty="0" smtClean="0">
+                <a:hlinkClick r:id="rId5"/>
+              </a:rPr>
+              <a:t>Angular</a:t>
+            </a:r>
+            <a:endParaRPr lang="en-US" dirty="0" smtClean="0"/>
+          </a:p>
+          <a:p>
+            <a:pPr lvl="1"/>
+            <a:endParaRPr lang="en-US" dirty="0">
+              <a:hlinkClick r:id="rId6"/>
+            </a:endParaRPr>
+          </a:p>
+          <a:p>
+            <a:pPr lvl="1"/>
+            <a:r>
+              <a:rPr lang="en-US" dirty="0" smtClean="0">
+                <a:hlinkClick r:id="rId6"/>
+              </a:rPr>
+              <a:t>Angular Seed Project (quick way to set up a project)</a:t>
+            </a:r>
+            <a:endParaRPr lang="en-US" dirty="0" smtClean="0"/>
+          </a:p>
+          <a:p>
+            <a:pPr lvl="1"/>
+            <a:endParaRPr lang="en-US" dirty="0">
+              <a:hlinkClick r:id="rId7"/>
+            </a:endParaRPr>
+          </a:p>
+          <a:p>
+            <a:pPr lvl="1"/>
+            <a:r>
+              <a:rPr lang="en-US" dirty="0">
+                <a:hlinkClick r:id="rId8"/>
+              </a:rPr>
+              <a:t>Experiment on </a:t>
+            </a:r>
+            <a:r>
+              <a:rPr lang="en-US" dirty="0" smtClean="0">
+                <a:hlinkClick r:id="rId8"/>
+              </a:rPr>
+              <a:t>digest loop runtime</a:t>
+            </a:r>
+            <a:endParaRPr lang="en-US" dirty="0"/>
+          </a:p>
+          <a:p>
+            <a:pPr lvl="1"/>
+            <a:endParaRPr lang="en-US" dirty="0">
+              <a:hlinkClick r:id="rId7"/>
+            </a:endParaRPr>
+          </a:p>
+          <a:p>
+            <a:endParaRPr lang="en-US" dirty="0" smtClean="0"/>
+          </a:p>
+          <a:p>
+            <a:endParaRPr lang="en-US" dirty="0"/>
+          </a:p>
+        </p:txBody>
+      </p:sp>
+    </p:spTree>
+    <p:extLst>
+      <p:ext uri="{BB962C8B-B14F-4D97-AF65-F5344CB8AC3E}">
+        <p14:creationId xmlns:p14="http://schemas.microsoft.com/office/powerpoint/2010/main" val="3594515280"/>
       </p:ext>
     </p:extLst>
   </p:cSld>
@@ -6454,6 +6725,15 @@
             <a:r>
               <a:rPr lang="en-US" dirty="0" smtClean="0"/>
               <a:t>Extend the HTML language</a:t>
+            </a:r>
+          </a:p>
+          <a:p>
+            <a:endParaRPr lang="en-US" dirty="0" smtClean="0"/>
+          </a:p>
+          <a:p>
+            <a:r>
+              <a:rPr lang="en-US" dirty="0" smtClean="0"/>
+              <a:t>Embeddable</a:t>
             </a:r>
           </a:p>
           <a:p>
@@ -7039,7 +7319,7 @@
         </p:spPr>
         <p:txBody>
           <a:bodyPr>
-            <a:normAutofit lnSpcReduction="10000"/>
+            <a:normAutofit/>
           </a:bodyPr>
           <a:lstStyle/>
           <a:p>
@@ -7077,15 +7357,9 @@
             <a:endParaRPr lang="en-US" dirty="0" smtClean="0"/>
           </a:p>
           <a:p>
-            <a:r>
-              <a:rPr lang="en-US" dirty="0" smtClean="0">
-                <a:hlinkClick r:id="rId2"/>
-              </a:rPr>
-              <a:t>Experiment on runtime</a:t>
-            </a:r>
-            <a:endParaRPr lang="en-US" dirty="0" smtClean="0"/>
-          </a:p>
-          <a:p>
+            <a:pPr marL="0" indent="0">
+              <a:buNone/>
+            </a:pPr>
             <a:endParaRPr lang="en-US" dirty="0"/>
           </a:p>
           <a:p>
@@ -7117,7 +7391,7 @@
           <p:nvPr/>
         </p:nvPicPr>
         <p:blipFill>
-          <a:blip r:embed="rId3">
+          <a:blip r:embed="rId2">
             <a:extLst>
               <a:ext uri="{28A0092B-C50C-407E-A947-70E740481C1C}">
                 <a14:useLocalDpi xmlns:a14="http://schemas.microsoft.com/office/drawing/2010/main" val="0"/>

</xml_diff>

<commit_message>
updated the doc and powerpoint slide with added details and new findings
</commit_message>
<xml_diff>
--- a/AngularJS.pptx
+++ b/AngularJS.pptx
@@ -210,7 +210,7 @@
           <a:p>
             <a:fld id="{663CEB14-25EF-490F-B676-E7937FF1A95F}" type="datetimeFigureOut">
               <a:rPr lang="en-US" smtClean="0"/>
-              <a:t>12/17/2014</a:t>
+              <a:t>12/19/2014</a:t>
             </a:fld>
             <a:endParaRPr lang="en-US"/>
           </a:p>
@@ -832,7 +832,7 @@
           <a:p>
             <a:fld id="{214BC22D-6E46-45DA-B571-0E339BF762D0}" type="datetimeFigureOut">
               <a:rPr lang="en-US" smtClean="0"/>
-              <a:t>12/17/2014</a:t>
+              <a:t>12/19/2014</a:t>
             </a:fld>
             <a:endParaRPr lang="en-US"/>
           </a:p>
@@ -1031,7 +1031,7 @@
           <a:p>
             <a:fld id="{214BC22D-6E46-45DA-B571-0E339BF762D0}" type="datetimeFigureOut">
               <a:rPr lang="en-US" smtClean="0"/>
-              <a:t>12/17/2014</a:t>
+              <a:t>12/19/2014</a:t>
             </a:fld>
             <a:endParaRPr lang="en-US"/>
           </a:p>
@@ -1221,7 +1221,7 @@
           <a:p>
             <a:fld id="{214BC22D-6E46-45DA-B571-0E339BF762D0}" type="datetimeFigureOut">
               <a:rPr lang="en-US" smtClean="0"/>
-              <a:t>12/17/2014</a:t>
+              <a:t>12/19/2014</a:t>
             </a:fld>
             <a:endParaRPr lang="en-US"/>
           </a:p>
@@ -1413,7 +1413,7 @@
           <a:p>
             <a:fld id="{214BC22D-6E46-45DA-B571-0E339BF762D0}" type="datetimeFigureOut">
               <a:rPr lang="en-US" smtClean="0"/>
-              <a:t>12/17/2014</a:t>
+              <a:t>12/19/2014</a:t>
             </a:fld>
             <a:endParaRPr lang="en-US"/>
           </a:p>
@@ -1639,7 +1639,7 @@
           <a:p>
             <a:fld id="{214BC22D-6E46-45DA-B571-0E339BF762D0}" type="datetimeFigureOut">
               <a:rPr lang="en-US" smtClean="0"/>
-              <a:t>12/17/2014</a:t>
+              <a:t>12/19/2014</a:t>
             </a:fld>
             <a:endParaRPr lang="en-US"/>
           </a:p>
@@ -1930,7 +1930,7 @@
           <a:p>
             <a:fld id="{214BC22D-6E46-45DA-B571-0E339BF762D0}" type="datetimeFigureOut">
               <a:rPr lang="en-US" smtClean="0"/>
-              <a:t>12/17/2014</a:t>
+              <a:t>12/19/2014</a:t>
             </a:fld>
             <a:endParaRPr lang="en-US"/>
           </a:p>
@@ -2361,7 +2361,7 @@
           <a:p>
             <a:fld id="{214BC22D-6E46-45DA-B571-0E339BF762D0}" type="datetimeFigureOut">
               <a:rPr lang="en-US" smtClean="0"/>
-              <a:t>12/17/2014</a:t>
+              <a:t>12/19/2014</a:t>
             </a:fld>
             <a:endParaRPr lang="en-US"/>
           </a:p>
@@ -2487,7 +2487,7 @@
           <a:p>
             <a:fld id="{214BC22D-6E46-45DA-B571-0E339BF762D0}" type="datetimeFigureOut">
               <a:rPr lang="en-US" smtClean="0"/>
-              <a:t>12/17/2014</a:t>
+              <a:t>12/19/2014</a:t>
             </a:fld>
             <a:endParaRPr lang="en-US"/>
           </a:p>
@@ -2590,7 +2590,7 @@
           <a:p>
             <a:fld id="{214BC22D-6E46-45DA-B571-0E339BF762D0}" type="datetimeFigureOut">
               <a:rPr lang="en-US" smtClean="0"/>
-              <a:t>12/17/2014</a:t>
+              <a:t>12/19/2014</a:t>
             </a:fld>
             <a:endParaRPr lang="en-US"/>
           </a:p>
@@ -2859,7 +2859,7 @@
           <a:p>
             <a:fld id="{214BC22D-6E46-45DA-B571-0E339BF762D0}" type="datetimeFigureOut">
               <a:rPr lang="en-US" smtClean="0"/>
-              <a:t>12/17/2014</a:t>
+              <a:t>12/19/2014</a:t>
             </a:fld>
             <a:endParaRPr lang="en-US"/>
           </a:p>
@@ -3223,7 +3223,7 @@
           <a:p>
             <a:fld id="{214BC22D-6E46-45DA-B571-0E339BF762D0}" type="datetimeFigureOut">
               <a:rPr lang="en-US" smtClean="0"/>
-              <a:t>12/17/2014</a:t>
+              <a:t>12/19/2014</a:t>
             </a:fld>
             <a:endParaRPr lang="en-US"/>
           </a:p>
@@ -3578,7 +3578,7 @@
           <a:p>
             <a:fld id="{214BC22D-6E46-45DA-B571-0E339BF762D0}" type="datetimeFigureOut">
               <a:rPr lang="en-US" smtClean="0"/>
-              <a:t>12/17/2014</a:t>
+              <a:t>12/19/2014</a:t>
             </a:fld>
             <a:endParaRPr lang="en-US"/>
           </a:p>
@@ -4535,27 +4535,7 @@
           <a:p>
             <a:r>
               <a:rPr lang="en-US" dirty="0" smtClean="0"/>
-              <a:t>Constructor </a:t>
-            </a:r>
-            <a:r>
-              <a:rPr lang="en-US" dirty="0" smtClean="0"/>
-              <a:t>function used to augment </a:t>
-            </a:r>
-            <a:r>
-              <a:rPr lang="en-US" dirty="0" smtClean="0"/>
-              <a:t>$scope (you can think of it as the </a:t>
-            </a:r>
-            <a:r>
-              <a:rPr lang="en-US" dirty="0" smtClean="0"/>
-              <a:t>v</a:t>
-            </a:r>
-            <a:r>
-              <a:rPr lang="en-US" dirty="0" smtClean="0"/>
-              <a:t>iew model</a:t>
-            </a:r>
-            <a:r>
-              <a:rPr lang="en-US" dirty="0" smtClean="0"/>
-              <a:t>)</a:t>
+              <a:t>Constructor function used to augment $scope (you can think of it as the view model)</a:t>
             </a:r>
           </a:p>
           <a:p>
@@ -4581,11 +4561,7 @@
           <a:p>
             <a:r>
               <a:rPr lang="en-US" dirty="0" smtClean="0"/>
-              <a:t>This is where your imperative logic belongs to</a:t>
-            </a:r>
-            <a:r>
-              <a:rPr lang="en-US" dirty="0" smtClean="0"/>
-              <a:t>!</a:t>
+              <a:t>This is where your imperative logic belongs to!</a:t>
             </a:r>
           </a:p>
           <a:p>
@@ -4593,13 +4569,7 @@
               <a:rPr lang="en-US" dirty="0" smtClean="0">
                 <a:hlinkClick r:id="rId2"/>
               </a:rPr>
-              <a:t>Simple e</a:t>
-            </a:r>
-            <a:r>
-              <a:rPr lang="en-US" dirty="0" smtClean="0">
-                <a:hlinkClick r:id="rId2"/>
-              </a:rPr>
-              <a:t>xample of controllers</a:t>
+              <a:t>Simple example of controllers</a:t>
             </a:r>
             <a:endParaRPr lang="en-US" dirty="0" smtClean="0"/>
           </a:p>
@@ -4696,7 +4666,6 @@
               <a:rPr lang="en-US" dirty="0" smtClean="0"/>
               <a:t>)</a:t>
             </a:r>
-            <a:endParaRPr lang="en-US" dirty="0" smtClean="0"/>
           </a:p>
           <a:p>
             <a:pPr lvl="1"/>
@@ -4891,11 +4860,7 @@
             </a:r>
             <a:r>
               <a:rPr lang="en-US" dirty="0" smtClean="0"/>
-              <a:t>  is matched </a:t>
-            </a:r>
-            <a:r>
-              <a:rPr lang="en-US" dirty="0" smtClean="0"/>
-              <a:t>by</a:t>
+              <a:t>  is matched by</a:t>
             </a:r>
           </a:p>
           <a:p>
@@ -4925,15 +4890,7 @@
           <a:p>
             <a:r>
               <a:rPr lang="en-US" dirty="0" smtClean="0"/>
-              <a:t>No more </a:t>
-            </a:r>
-            <a:r>
-              <a:rPr lang="en-US" dirty="0" smtClean="0"/>
-              <a:t>of this</a:t>
-            </a:r>
-            <a:r>
-              <a:rPr lang="en-US" dirty="0" smtClean="0"/>
-              <a:t>:</a:t>
+              <a:t>No more of this:</a:t>
             </a:r>
           </a:p>
           <a:p>
@@ -5384,21 +5341,8 @@
             <a:pPr lvl="1"/>
             <a:r>
               <a:rPr lang="en-US" dirty="0" smtClean="0"/>
-              <a:t>To test modules, we </a:t>
-            </a:r>
-            <a:r>
-              <a:rPr lang="en-US" dirty="0" smtClean="0"/>
-              <a:t>can just </a:t>
-            </a:r>
-            <a:r>
-              <a:rPr lang="en-US" dirty="0" smtClean="0"/>
-              <a:t>inject mock </a:t>
-            </a:r>
-            <a:r>
-              <a:rPr lang="en-US" dirty="0" smtClean="0"/>
-              <a:t>data, on a test by test basis</a:t>
-            </a:r>
-            <a:endParaRPr lang="en-US" dirty="0" smtClean="0"/>
+              <a:t>To test modules, we can just inject mock data, on a test by test basis</a:t>
+            </a:r>
           </a:p>
           <a:p>
             <a:endParaRPr lang="en-US" dirty="0" smtClean="0"/>
@@ -5534,14 +5478,12 @@
               <a:rPr lang="en-US" dirty="0" smtClean="0"/>
               <a:t>Good separation of concerns </a:t>
             </a:r>
-            <a:endParaRPr lang="en-US" dirty="0" smtClean="0"/>
           </a:p>
           <a:p>
             <a:r>
               <a:rPr lang="en-US" dirty="0" smtClean="0"/>
               <a:t>Two-way data-binding!!!</a:t>
             </a:r>
-            <a:endParaRPr lang="en-US" dirty="0" smtClean="0"/>
           </a:p>
           <a:p>
             <a:r>
@@ -5686,11 +5628,7 @@
           <a:p>
             <a:r>
               <a:rPr lang="en-US" dirty="0" smtClean="0"/>
-              <a:t>Useful </a:t>
-            </a:r>
-            <a:r>
-              <a:rPr lang="en-US" dirty="0" smtClean="0"/>
-              <a:t>Links and Articles</a:t>
+              <a:t>Useful Links and Articles</a:t>
             </a:r>
             <a:endParaRPr lang="en-US" dirty="0">
               <a:hlinkClick r:id="rId2"/>
@@ -5714,13 +5652,7 @@
               <a:rPr lang="en-US" dirty="0" smtClean="0">
                 <a:hlinkClick r:id="rId2"/>
               </a:rPr>
-              <a:t>, Backbone.js and </a:t>
-            </a:r>
-            <a:r>
-              <a:rPr lang="en-US" dirty="0" smtClean="0">
-                <a:hlinkClick r:id="rId2"/>
-              </a:rPr>
-              <a:t>Ember.js</a:t>
+              <a:t>, Backbone.js and Ember.js</a:t>
             </a:r>
             <a:endParaRPr lang="en-US" dirty="0" smtClean="0"/>
           </a:p>
@@ -5773,19 +5705,7 @@
               <a:rPr lang="en-US" dirty="0" smtClean="0">
                 <a:hlinkClick r:id="rId5"/>
               </a:rPr>
-              <a:t>A </a:t>
-            </a:r>
-            <a:r>
-              <a:rPr lang="en-US" dirty="0" smtClean="0">
-                <a:hlinkClick r:id="rId5"/>
-              </a:rPr>
-              <a:t>bit more information on the Digest </a:t>
-            </a:r>
-            <a:r>
-              <a:rPr lang="en-US" dirty="0" smtClean="0">
-                <a:hlinkClick r:id="rId5"/>
-              </a:rPr>
-              <a:t>Loop</a:t>
+              <a:t>A bit more information on the Digest Loop</a:t>
             </a:r>
             <a:endParaRPr lang="en-US" dirty="0" smtClean="0"/>
           </a:p>
@@ -6061,7 +5981,7 @@
         <p:spPr/>
         <p:txBody>
           <a:bodyPr>
-            <a:normAutofit lnSpcReduction="10000"/>
+            <a:normAutofit/>
           </a:bodyPr>
           <a:lstStyle/>
           <a:p>
@@ -6080,13 +6000,6 @@
             <a:r>
               <a:rPr lang="en-US" dirty="0" smtClean="0"/>
               <a:t>Data binding</a:t>
-            </a:r>
-          </a:p>
-          <a:p>
-            <a:pPr lvl="1"/>
-            <a:r>
-              <a:rPr lang="en-US" dirty="0" smtClean="0"/>
-              <a:t>Digest Loop</a:t>
             </a:r>
           </a:p>
           <a:p>
@@ -6450,16 +6363,13 @@
           <a:p>
             <a:r>
               <a:rPr lang="en-US" dirty="0" smtClean="0"/>
-              <a:t>Developed 2009 as part of </a:t>
+              <a:t>Developed 2009 as part of, a larger commercial product called </a:t>
             </a:r>
             <a:r>
               <a:rPr lang="en-US" dirty="0" err="1" smtClean="0"/>
               <a:t>GetAngular</a:t>
             </a:r>
-            <a:r>
-              <a:rPr lang="en-US" dirty="0" smtClean="0"/>
-              <a:t>, a larger commercial product</a:t>
-            </a:r>
+            <a:endParaRPr lang="en-US" dirty="0" smtClean="0"/>
           </a:p>
           <a:p>
             <a:endParaRPr lang="en-US" dirty="0"/>
@@ -6561,32 +6471,47 @@
             <p:ph idx="1"/>
           </p:nvPr>
         </p:nvSpPr>
-        <p:spPr/>
-        <p:txBody>
-          <a:bodyPr/>
+        <p:spPr>
+          <a:xfrm>
+            <a:off x="457200" y="1600200"/>
+            <a:ext cx="7772400" cy="5029200"/>
+          </a:xfrm>
+        </p:spPr>
+        <p:txBody>
+          <a:bodyPr>
+            <a:normAutofit/>
+          </a:bodyPr>
           <a:lstStyle/>
           <a:p>
             <a:r>
               <a:rPr lang="en-US" dirty="0"/>
-              <a:t>Declarative: “What you want to </a:t>
-            </a:r>
-            <a:r>
-              <a:rPr lang="en-US" dirty="0" smtClean="0"/>
-              <a:t>happen” </a:t>
-            </a:r>
-          </a:p>
-          <a:p>
+              <a:t>Declarative: </a:t>
+            </a:r>
+            <a:r>
+              <a:rPr lang="en-US" dirty="0" smtClean="0"/>
+              <a:t>What </a:t>
+            </a:r>
+            <a:r>
+              <a:rPr lang="en-US" dirty="0"/>
+              <a:t>you </a:t>
+            </a:r>
+            <a:r>
+              <a:rPr lang="en-US" dirty="0" smtClean="0"/>
+              <a:t>would like to happen </a:t>
+            </a:r>
+          </a:p>
+          <a:p>
+            <a:pPr lvl="1"/>
+            <a:r>
+              <a:rPr lang="en-US" dirty="0" smtClean="0"/>
+              <a:t>computer figure the rest out</a:t>
+            </a:r>
+          </a:p>
+          <a:p>
+            <a:pPr marL="292608" lvl="1" indent="0">
+              <a:buNone/>
+            </a:pPr>
             <a:endParaRPr lang="en-US" dirty="0" smtClean="0"/>
-          </a:p>
-          <a:p>
-            <a:r>
-              <a:rPr lang="en-US" dirty="0"/>
-              <a:t>Imperative: “What you would like to </a:t>
-            </a:r>
-            <a:r>
-              <a:rPr lang="en-US" dirty="0" smtClean="0"/>
-              <a:t>happen”</a:t>
-            </a:r>
           </a:p>
           <a:p>
             <a:pPr marL="292608" lvl="1" indent="0">
@@ -6595,6 +6520,35 @@
             <a:endParaRPr lang="en-US" dirty="0"/>
           </a:p>
           <a:p>
+            <a:pPr marL="292608" lvl="1" indent="0">
+              <a:buNone/>
+            </a:pPr>
+            <a:endParaRPr lang="en-US" dirty="0" smtClean="0"/>
+          </a:p>
+          <a:p>
+            <a:r>
+              <a:rPr lang="en-US" dirty="0"/>
+              <a:t>Imperative: </a:t>
+            </a:r>
+            <a:r>
+              <a:rPr lang="en-US" dirty="0" smtClean="0"/>
+              <a:t>Tell computer how to do something</a:t>
+            </a:r>
+          </a:p>
+          <a:p>
+            <a:pPr lvl="1"/>
+            <a:r>
+              <a:rPr lang="en-US" dirty="0" smtClean="0"/>
+              <a:t> what you want to happen will happen </a:t>
+            </a:r>
+          </a:p>
+          <a:p>
+            <a:pPr marL="292608" lvl="1" indent="0">
+              <a:buNone/>
+            </a:pPr>
+            <a:endParaRPr lang="en-US" dirty="0"/>
+          </a:p>
+          <a:p>
             <a:pPr lvl="1"/>
             <a:endParaRPr lang="en-US" dirty="0"/>
           </a:p>
@@ -6602,12 +6556,35 @@
       </p:sp>
       <p:pic>
         <p:nvPicPr>
-          <p:cNvPr id="4" name="Picture 3" descr="http://www.infoq.com/resource/articles/backbone-vs-angular/en/resources/1Imagine2.png"/>
+          <p:cNvPr id="6" name="Picture 5"/>
           <p:cNvPicPr/>
           <p:nvPr/>
         </p:nvPicPr>
+        <p:blipFill rotWithShape="1">
+          <a:blip r:embed="rId2"/>
+          <a:srcRect t="5064" r="7780" b="15259"/>
+          <a:stretch/>
+        </p:blipFill>
+        <p:spPr>
+          <a:xfrm>
+            <a:off x="990600" y="4761931"/>
+            <a:ext cx="5555634" cy="1662752"/>
+          </a:xfrm>
+          <a:prstGeom prst="rect">
+            <a:avLst/>
+          </a:prstGeom>
+        </p:spPr>
+      </p:pic>
+      <p:pic>
+        <p:nvPicPr>
+          <p:cNvPr id="1026" name="Picture 2"/>
+          <p:cNvPicPr>
+            <a:picLocks noChangeAspect="1" noChangeArrowheads="1"/>
+          </p:cNvPicPr>
+          <p:nvPr/>
+        </p:nvPicPr>
         <p:blipFill>
-          <a:blip r:embed="rId2" cstate="print">
+          <a:blip r:embed="rId3">
             <a:extLst>
               <a:ext uri="{28A0092B-C50C-407E-A947-70E740481C1C}">
                 <a14:useLocalDpi xmlns:a14="http://schemas.microsoft.com/office/drawing/2010/main" val="0"/>
@@ -6621,8 +6598,8 @@
         </p:blipFill>
         <p:spPr bwMode="auto">
           <a:xfrm>
-            <a:off x="1143000" y="3200400"/>
-            <a:ext cx="5638800" cy="3493371"/>
+            <a:off x="1143000" y="2505360"/>
+            <a:ext cx="5555634" cy="1326936"/>
           </a:xfrm>
           <a:prstGeom prst="rect">
             <a:avLst/>
@@ -6631,6 +6608,25 @@
           <a:ln>
             <a:noFill/>
           </a:ln>
+          <a:extLst>
+            <a:ext uri="{909E8E84-426E-40DD-AFC4-6F175D3DCCD1}">
+              <a14:hiddenFill xmlns:a14="http://schemas.microsoft.com/office/drawing/2010/main">
+                <a:solidFill>
+                  <a:schemeClr val="accent1"/>
+                </a:solidFill>
+              </a14:hiddenFill>
+            </a:ext>
+            <a:ext uri="{91240B29-F687-4F45-9708-019B960494DF}">
+              <a14:hiddenLine xmlns:a14="http://schemas.microsoft.com/office/drawing/2010/main" w="9525">
+                <a:solidFill>
+                  <a:schemeClr val="tx1"/>
+                </a:solidFill>
+                <a:miter lim="800000"/>
+                <a:headEnd/>
+                <a:tailEnd/>
+              </a14:hiddenLine>
+            </a:ext>
+          </a:extLst>
         </p:spPr>
       </p:pic>
     </p:spTree>
@@ -6710,6 +6706,9 @@
           </a:bodyPr>
           <a:lstStyle/>
           <a:p>
+            <a:endParaRPr lang="en-US" dirty="0" smtClean="0"/>
+          </a:p>
+          <a:p>
             <a:r>
               <a:rPr lang="en-US" dirty="0" smtClean="0"/>
               <a:t>Two-way Data-Binding</a:t>
@@ -6725,15 +6724,6 @@
             <a:r>
               <a:rPr lang="en-US" dirty="0" smtClean="0"/>
               <a:t>Extend the HTML language</a:t>
-            </a:r>
-          </a:p>
-          <a:p>
-            <a:endParaRPr lang="en-US" dirty="0" smtClean="0"/>
-          </a:p>
-          <a:p>
-            <a:r>
-              <a:rPr lang="en-US" dirty="0" smtClean="0"/>
-              <a:t>Embeddable</a:t>
             </a:r>
           </a:p>
           <a:p>
@@ -7146,7 +7136,7 @@
           <a:p>
             <a:r>
               <a:rPr lang="en-US" dirty="0" smtClean="0"/>
-              <a:t>Digest Loop</a:t>
+              <a:t>Watch List</a:t>
             </a:r>
             <a:endParaRPr lang="en-US" dirty="0"/>
           </a:p>
@@ -7164,8 +7154,8 @@
         </p:nvSpPr>
         <p:spPr>
           <a:xfrm>
-            <a:off x="381000" y="1609416"/>
-            <a:ext cx="7315200" cy="4846320"/>
+            <a:off x="381000" y="1524000"/>
+            <a:ext cx="7315200" cy="5172384"/>
           </a:xfrm>
         </p:spPr>
         <p:txBody>
@@ -7174,7 +7164,7 @@
           <a:p>
             <a:r>
               <a:rPr lang="en-US" dirty="0" smtClean="0"/>
-              <a:t>Bindings (ng-bind or the {{ }} ) are tracked with a </a:t>
+              <a:t>During bootstrap process, bindings (ng-bind or the {{ }} ) are tracked with a </a:t>
             </a:r>
             <a:r>
               <a:rPr lang="en-US" i="1" dirty="0" smtClean="0"/>
@@ -7184,6 +7174,8 @@
               <a:rPr lang="en-US" dirty="0" smtClean="0"/>
               <a:t> function and added to the $watch list</a:t>
             </a:r>
+          </a:p>
+          <a:p>
             <a:endParaRPr lang="en-US" dirty="0"/>
           </a:p>
           <a:p>
@@ -7229,7 +7221,7 @@
         </p:blipFill>
         <p:spPr bwMode="auto">
           <a:xfrm>
-            <a:off x="1752600" y="3810000"/>
+            <a:off x="1905000" y="4114800"/>
             <a:ext cx="4827356" cy="2743200"/>
           </a:xfrm>
           <a:prstGeom prst="rect">

</xml_diff>